<commit_message>
Mas cambios y ajustes.  Reforce con mas info la parte de resultados
</commit_message>
<xml_diff>
--- a/Presentación1.pptx
+++ b/Presentación1.pptx
@@ -6,6 +6,8 @@
   </p:sldMasterIdLst>
   <p:sldIdLst>
     <p:sldId id="256" r:id="rId2"/>
+    <p:sldId id="257" r:id="rId3"/>
+    <p:sldId id="258" r:id="rId4"/>
   </p:sldIdLst>
   <p:sldSz cx="9144000" cy="6858000" type="screen4x3"/>
   <p:notesSz cx="6858000" cy="9144000"/>
@@ -104,6 +106,22 @@
       </a:defRPr>
     </a:lvl9pPr>
   </p:defaultTextStyle>
+  <p:extLst>
+    <p:ext uri="{EFAFB233-063F-42B5-8137-9DF3F51BA10A}">
+      <p15:sldGuideLst xmlns:p15="http://schemas.microsoft.com/office/powerpoint/2012/main">
+        <p15:guide id="1" orient="horz" pos="2160">
+          <p15:clr>
+            <a:srgbClr val="A4A3A4"/>
+          </p15:clr>
+        </p15:guide>
+        <p15:guide id="2" pos="2880">
+          <p15:clr>
+            <a:srgbClr val="A4A3A4"/>
+          </p15:clr>
+        </p15:guide>
+      </p15:sldGuideLst>
+    </p:ext>
+  </p:extLst>
 </p:presentation>
 </file>
 
@@ -288,7 +306,7 @@
           <a:p>
             <a:fld id="{5A6242FD-C54A-4856-877F-3D45C0299D27}" type="datetimeFigureOut">
               <a:rPr lang="es-AR" smtClean="0"/>
-              <a:t>11/12/2017</a:t>
+              <a:t>15/12/17</a:t>
             </a:fld>
             <a:endParaRPr lang="es-AR"/>
           </a:p>
@@ -330,7 +348,7 @@
           <a:p>
             <a:fld id="{0AB15C64-9304-49FC-B1CC-D590FA5E7135}" type="slidenum">
               <a:rPr lang="es-AR" smtClean="0"/>
-              <a:t>‹Nº›</a:t>
+              <a:t>‹#›</a:t>
             </a:fld>
             <a:endParaRPr lang="es-AR"/>
           </a:p>
@@ -458,7 +476,7 @@
           <a:p>
             <a:fld id="{5A6242FD-C54A-4856-877F-3D45C0299D27}" type="datetimeFigureOut">
               <a:rPr lang="es-AR" smtClean="0"/>
-              <a:t>11/12/2017</a:t>
+              <a:t>15/12/17</a:t>
             </a:fld>
             <a:endParaRPr lang="es-AR"/>
           </a:p>
@@ -500,7 +518,7 @@
           <a:p>
             <a:fld id="{0AB15C64-9304-49FC-B1CC-D590FA5E7135}" type="slidenum">
               <a:rPr lang="es-AR" smtClean="0"/>
-              <a:t>‹Nº›</a:t>
+              <a:t>‹#›</a:t>
             </a:fld>
             <a:endParaRPr lang="es-AR"/>
           </a:p>
@@ -638,7 +656,7 @@
           <a:p>
             <a:fld id="{5A6242FD-C54A-4856-877F-3D45C0299D27}" type="datetimeFigureOut">
               <a:rPr lang="es-AR" smtClean="0"/>
-              <a:t>11/12/2017</a:t>
+              <a:t>15/12/17</a:t>
             </a:fld>
             <a:endParaRPr lang="es-AR"/>
           </a:p>
@@ -680,7 +698,7 @@
           <a:p>
             <a:fld id="{0AB15C64-9304-49FC-B1CC-D590FA5E7135}" type="slidenum">
               <a:rPr lang="es-AR" smtClean="0"/>
-              <a:t>‹Nº›</a:t>
+              <a:t>‹#›</a:t>
             </a:fld>
             <a:endParaRPr lang="es-AR"/>
           </a:p>
@@ -808,7 +826,7 @@
           <a:p>
             <a:fld id="{5A6242FD-C54A-4856-877F-3D45C0299D27}" type="datetimeFigureOut">
               <a:rPr lang="es-AR" smtClean="0"/>
-              <a:t>11/12/2017</a:t>
+              <a:t>15/12/17</a:t>
             </a:fld>
             <a:endParaRPr lang="es-AR"/>
           </a:p>
@@ -850,7 +868,7 @@
           <a:p>
             <a:fld id="{0AB15C64-9304-49FC-B1CC-D590FA5E7135}" type="slidenum">
               <a:rPr lang="es-AR" smtClean="0"/>
-              <a:t>‹Nº›</a:t>
+              <a:t>‹#›</a:t>
             </a:fld>
             <a:endParaRPr lang="es-AR"/>
           </a:p>
@@ -1054,7 +1072,7 @@
           <a:p>
             <a:fld id="{5A6242FD-C54A-4856-877F-3D45C0299D27}" type="datetimeFigureOut">
               <a:rPr lang="es-AR" smtClean="0"/>
-              <a:t>11/12/2017</a:t>
+              <a:t>15/12/17</a:t>
             </a:fld>
             <a:endParaRPr lang="es-AR"/>
           </a:p>
@@ -1096,7 +1114,7 @@
           <a:p>
             <a:fld id="{0AB15C64-9304-49FC-B1CC-D590FA5E7135}" type="slidenum">
               <a:rPr lang="es-AR" smtClean="0"/>
-              <a:t>‹Nº›</a:t>
+              <a:t>‹#›</a:t>
             </a:fld>
             <a:endParaRPr lang="es-AR"/>
           </a:p>
@@ -1342,7 +1360,7 @@
           <a:p>
             <a:fld id="{5A6242FD-C54A-4856-877F-3D45C0299D27}" type="datetimeFigureOut">
               <a:rPr lang="es-AR" smtClean="0"/>
-              <a:t>11/12/2017</a:t>
+              <a:t>15/12/17</a:t>
             </a:fld>
             <a:endParaRPr lang="es-AR"/>
           </a:p>
@@ -1384,7 +1402,7 @@
           <a:p>
             <a:fld id="{0AB15C64-9304-49FC-B1CC-D590FA5E7135}" type="slidenum">
               <a:rPr lang="es-AR" smtClean="0"/>
-              <a:t>‹Nº›</a:t>
+              <a:t>‹#›</a:t>
             </a:fld>
             <a:endParaRPr lang="es-AR"/>
           </a:p>
@@ -1764,7 +1782,7 @@
           <a:p>
             <a:fld id="{5A6242FD-C54A-4856-877F-3D45C0299D27}" type="datetimeFigureOut">
               <a:rPr lang="es-AR" smtClean="0"/>
-              <a:t>11/12/2017</a:t>
+              <a:t>15/12/17</a:t>
             </a:fld>
             <a:endParaRPr lang="es-AR"/>
           </a:p>
@@ -1806,7 +1824,7 @@
           <a:p>
             <a:fld id="{0AB15C64-9304-49FC-B1CC-D590FA5E7135}" type="slidenum">
               <a:rPr lang="es-AR" smtClean="0"/>
-              <a:t>‹Nº›</a:t>
+              <a:t>‹#›</a:t>
             </a:fld>
             <a:endParaRPr lang="es-AR"/>
           </a:p>
@@ -1882,7 +1900,7 @@
           <a:p>
             <a:fld id="{5A6242FD-C54A-4856-877F-3D45C0299D27}" type="datetimeFigureOut">
               <a:rPr lang="es-AR" smtClean="0"/>
-              <a:t>11/12/2017</a:t>
+              <a:t>15/12/17</a:t>
             </a:fld>
             <a:endParaRPr lang="es-AR"/>
           </a:p>
@@ -1924,7 +1942,7 @@
           <a:p>
             <a:fld id="{0AB15C64-9304-49FC-B1CC-D590FA5E7135}" type="slidenum">
               <a:rPr lang="es-AR" smtClean="0"/>
-              <a:t>‹Nº›</a:t>
+              <a:t>‹#›</a:t>
             </a:fld>
             <a:endParaRPr lang="es-AR"/>
           </a:p>
@@ -1977,7 +1995,7 @@
           <a:p>
             <a:fld id="{5A6242FD-C54A-4856-877F-3D45C0299D27}" type="datetimeFigureOut">
               <a:rPr lang="es-AR" smtClean="0"/>
-              <a:t>11/12/2017</a:t>
+              <a:t>15/12/17</a:t>
             </a:fld>
             <a:endParaRPr lang="es-AR"/>
           </a:p>
@@ -2019,7 +2037,7 @@
           <a:p>
             <a:fld id="{0AB15C64-9304-49FC-B1CC-D590FA5E7135}" type="slidenum">
               <a:rPr lang="es-AR" smtClean="0"/>
-              <a:t>‹Nº›</a:t>
+              <a:t>‹#›</a:t>
             </a:fld>
             <a:endParaRPr lang="es-AR"/>
           </a:p>
@@ -2254,7 +2272,7 @@
           <a:p>
             <a:fld id="{5A6242FD-C54A-4856-877F-3D45C0299D27}" type="datetimeFigureOut">
               <a:rPr lang="es-AR" smtClean="0"/>
-              <a:t>11/12/2017</a:t>
+              <a:t>15/12/17</a:t>
             </a:fld>
             <a:endParaRPr lang="es-AR"/>
           </a:p>
@@ -2296,7 +2314,7 @@
           <a:p>
             <a:fld id="{0AB15C64-9304-49FC-B1CC-D590FA5E7135}" type="slidenum">
               <a:rPr lang="es-AR" smtClean="0"/>
-              <a:t>‹Nº›</a:t>
+              <a:t>‹#›</a:t>
             </a:fld>
             <a:endParaRPr lang="es-AR"/>
           </a:p>
@@ -2507,7 +2525,7 @@
           <a:p>
             <a:fld id="{5A6242FD-C54A-4856-877F-3D45C0299D27}" type="datetimeFigureOut">
               <a:rPr lang="es-AR" smtClean="0"/>
-              <a:t>11/12/2017</a:t>
+              <a:t>15/12/17</a:t>
             </a:fld>
             <a:endParaRPr lang="es-AR"/>
           </a:p>
@@ -2549,7 +2567,7 @@
           <a:p>
             <a:fld id="{0AB15C64-9304-49FC-B1CC-D590FA5E7135}" type="slidenum">
               <a:rPr lang="es-AR" smtClean="0"/>
-              <a:t>‹Nº›</a:t>
+              <a:t>‹#›</a:t>
             </a:fld>
             <a:endParaRPr lang="es-AR"/>
           </a:p>
@@ -2720,7 +2738,7 @@
           <a:p>
             <a:fld id="{5A6242FD-C54A-4856-877F-3D45C0299D27}" type="datetimeFigureOut">
               <a:rPr lang="es-AR" smtClean="0"/>
-              <a:t>11/12/2017</a:t>
+              <a:t>15/12/17</a:t>
             </a:fld>
             <a:endParaRPr lang="es-AR"/>
           </a:p>
@@ -2798,7 +2816,7 @@
           <a:p>
             <a:fld id="{0AB15C64-9304-49FC-B1CC-D590FA5E7135}" type="slidenum">
               <a:rPr lang="es-AR" smtClean="0"/>
-              <a:t>‹Nº›</a:t>
+              <a:t>‹#›</a:t>
             </a:fld>
             <a:endParaRPr lang="es-AR"/>
           </a:p>
@@ -3203,6 +3221,238 @@
 </p:sld>
 </file>
 
+<file path=ppt/slides/slide2.xml><?xml version="1.0" encoding="utf-8"?>
+<p:sld xmlns:a="http://schemas.openxmlformats.org/drawingml/2006/main" xmlns:r="http://schemas.openxmlformats.org/officeDocument/2006/relationships" xmlns:p="http://schemas.openxmlformats.org/presentationml/2006/main">
+  <p:cSld>
+    <p:spTree>
+      <p:nvGrpSpPr>
+        <p:cNvPr id="1" name=""/>
+        <p:cNvGrpSpPr/>
+        <p:nvPr/>
+      </p:nvGrpSpPr>
+      <p:grpSpPr>
+        <a:xfrm>
+          <a:off x="0" y="0"/>
+          <a:ext cx="0" cy="0"/>
+          <a:chOff x="0" y="0"/>
+          <a:chExt cx="0" cy="0"/>
+        </a:xfrm>
+      </p:grpSpPr>
+      <p:pic>
+        <p:nvPicPr>
+          <p:cNvPr id="2" name="Picture 1"/>
+          <p:cNvPicPr>
+            <a:picLocks noChangeAspect="1"/>
+          </p:cNvPicPr>
+          <p:nvPr/>
+        </p:nvPicPr>
+        <p:blipFill>
+          <a:blip r:embed="rId2"/>
+          <a:stretch>
+            <a:fillRect/>
+          </a:stretch>
+        </p:blipFill>
+        <p:spPr>
+          <a:xfrm>
+            <a:off x="-1423768" y="-891480"/>
+            <a:ext cx="11991536" cy="9793088"/>
+          </a:xfrm>
+          <a:prstGeom prst="rect">
+            <a:avLst/>
+          </a:prstGeom>
+        </p:spPr>
+      </p:pic>
+      <p:sp>
+        <p:nvSpPr>
+          <p:cNvPr id="8" name="5 Elipse"/>
+          <p:cNvSpPr/>
+          <p:nvPr/>
+        </p:nvSpPr>
+        <p:spPr>
+          <a:xfrm>
+            <a:off x="4746104" y="3356992"/>
+            <a:ext cx="185936" cy="188811"/>
+          </a:xfrm>
+          <a:prstGeom prst="ellipse">
+            <a:avLst/>
+          </a:prstGeom>
+          <a:solidFill>
+            <a:srgbClr val="FF0000"/>
+          </a:solidFill>
+        </p:spPr>
+        <p:style>
+          <a:lnRef idx="2">
+            <a:schemeClr val="accent1">
+              <a:shade val="50000"/>
+            </a:schemeClr>
+          </a:lnRef>
+          <a:fillRef idx="1">
+            <a:schemeClr val="accent1"/>
+          </a:fillRef>
+          <a:effectRef idx="0">
+            <a:schemeClr val="accent1"/>
+          </a:effectRef>
+          <a:fontRef idx="minor">
+            <a:schemeClr val="lt1"/>
+          </a:fontRef>
+        </p:style>
+        <p:txBody>
+          <a:bodyPr rtlCol="0" anchor="ctr"/>
+          <a:lstStyle/>
+          <a:p>
+            <a:pPr algn="ctr"/>
+            <a:endParaRPr lang="es-AR"/>
+          </a:p>
+        </p:txBody>
+      </p:sp>
+    </p:spTree>
+    <p:extLst>
+      <p:ext uri="{BB962C8B-B14F-4D97-AF65-F5344CB8AC3E}">
+        <p14:creationId xmlns:p14="http://schemas.microsoft.com/office/powerpoint/2010/main" val="1128896170"/>
+      </p:ext>
+    </p:extLst>
+  </p:cSld>
+  <p:clrMapOvr>
+    <a:masterClrMapping/>
+  </p:clrMapOvr>
+  <p:timing>
+    <p:tnLst>
+      <p:par>
+        <p:cTn id="1" dur="indefinite" restart="never" nodeType="tmRoot"/>
+      </p:par>
+    </p:tnLst>
+  </p:timing>
+</p:sld>
+</file>
+
+<file path=ppt/slides/slide3.xml><?xml version="1.0" encoding="utf-8"?>
+<p:sld xmlns:a="http://schemas.openxmlformats.org/drawingml/2006/main" xmlns:r="http://schemas.openxmlformats.org/officeDocument/2006/relationships" xmlns:p="http://schemas.openxmlformats.org/presentationml/2006/main">
+  <p:cSld>
+    <p:spTree>
+      <p:nvGrpSpPr>
+        <p:cNvPr id="1" name=""/>
+        <p:cNvGrpSpPr/>
+        <p:nvPr/>
+      </p:nvGrpSpPr>
+      <p:grpSpPr>
+        <a:xfrm>
+          <a:off x="0" y="0"/>
+          <a:ext cx="0" cy="0"/>
+          <a:chOff x="0" y="0"/>
+          <a:chExt cx="0" cy="0"/>
+        </a:xfrm>
+      </p:grpSpPr>
+      <p:pic>
+        <p:nvPicPr>
+          <p:cNvPr id="2" name="Picture 1"/>
+          <p:cNvPicPr>
+            <a:picLocks noChangeAspect="1"/>
+          </p:cNvPicPr>
+          <p:nvPr/>
+        </p:nvPicPr>
+        <p:blipFill>
+          <a:blip r:embed="rId2"/>
+          <a:stretch>
+            <a:fillRect/>
+          </a:stretch>
+        </p:blipFill>
+        <p:spPr>
+          <a:xfrm>
+            <a:off x="-1423768" y="-891480"/>
+            <a:ext cx="11991536" cy="9793088"/>
+          </a:xfrm>
+          <a:prstGeom prst="rect">
+            <a:avLst/>
+          </a:prstGeom>
+        </p:spPr>
+      </p:pic>
+      <p:sp>
+        <p:nvSpPr>
+          <p:cNvPr id="8" name="5 Elipse"/>
+          <p:cNvSpPr/>
+          <p:nvPr/>
+        </p:nvSpPr>
+        <p:spPr>
+          <a:xfrm>
+            <a:off x="4746104" y="3356992"/>
+            <a:ext cx="185936" cy="188811"/>
+          </a:xfrm>
+          <a:prstGeom prst="ellipse">
+            <a:avLst/>
+          </a:prstGeom>
+          <a:solidFill>
+            <a:srgbClr val="FF0000"/>
+          </a:solidFill>
+        </p:spPr>
+        <p:style>
+          <a:lnRef idx="2">
+            <a:schemeClr val="accent1">
+              <a:shade val="50000"/>
+            </a:schemeClr>
+          </a:lnRef>
+          <a:fillRef idx="1">
+            <a:schemeClr val="accent1"/>
+          </a:fillRef>
+          <a:effectRef idx="0">
+            <a:schemeClr val="accent1"/>
+          </a:effectRef>
+          <a:fontRef idx="minor">
+            <a:schemeClr val="lt1"/>
+          </a:fontRef>
+        </p:style>
+        <p:txBody>
+          <a:bodyPr rtlCol="0" anchor="ctr"/>
+          <a:lstStyle/>
+          <a:p>
+            <a:pPr algn="ctr"/>
+            <a:endParaRPr lang="es-AR"/>
+          </a:p>
+        </p:txBody>
+      </p:sp>
+      <p:pic>
+        <p:nvPicPr>
+          <p:cNvPr id="3" name="Picture 2"/>
+          <p:cNvPicPr>
+            <a:picLocks noChangeAspect="1"/>
+          </p:cNvPicPr>
+          <p:nvPr/>
+        </p:nvPicPr>
+        <p:blipFill>
+          <a:blip r:embed="rId3"/>
+          <a:stretch>
+            <a:fillRect/>
+          </a:stretch>
+        </p:blipFill>
+        <p:spPr>
+          <a:xfrm>
+            <a:off x="-2916832" y="468138"/>
+            <a:ext cx="14944116" cy="7425358"/>
+          </a:xfrm>
+          <a:prstGeom prst="rect">
+            <a:avLst/>
+          </a:prstGeom>
+        </p:spPr>
+      </p:pic>
+    </p:spTree>
+    <p:extLst>
+      <p:ext uri="{BB962C8B-B14F-4D97-AF65-F5344CB8AC3E}">
+        <p14:creationId xmlns:p14="http://schemas.microsoft.com/office/powerpoint/2010/main" val="731287558"/>
+      </p:ext>
+    </p:extLst>
+  </p:cSld>
+  <p:clrMapOvr>
+    <a:masterClrMapping/>
+  </p:clrMapOvr>
+  <p:timing>
+    <p:tnLst>
+      <p:par>
+        <p:cTn id="1" dur="indefinite" restart="never" nodeType="tmRoot"/>
+      </p:par>
+    </p:tnLst>
+  </p:timing>
+</p:sld>
+</file>
+
 <file path=ppt/theme/theme1.xml><?xml version="1.0" encoding="utf-8"?>
 <a:theme xmlns:a="http://schemas.openxmlformats.org/drawingml/2006/main" name="Tema de Office">
   <a:themeElements>

</xml_diff>